<commit_message>
Update powerpoint and readme
</commit_message>
<xml_diff>
--- a/Presentation.pptx
+++ b/Presentation.pptx
@@ -3442,8 +3442,12 @@
           <a:lstStyle/>
           <a:p>
             <a:r>
-              <a:rPr lang="en-US" dirty="0"/>
-              <a:t>An example Factory Pattern</a:t>
+              <a:rPr lang="en-US" dirty="0" err="1"/>
+              <a:t>get_person</a:t>
+            </a:r>
+            <a:r>
+              <a:rPr lang="en-US" dirty="0"/>
+              <a:t> is an example of the Factory Pattern</a:t>
             </a:r>
           </a:p>
           <a:p>
@@ -13366,6 +13370,19 @@
           <a:p>
             <a:r>
               <a:rPr lang="en-US" dirty="0"/>
+              <a:t>Mozilla started sponsoring Rust in 2009</a:t>
+            </a:r>
+          </a:p>
+          <a:p>
+            <a:pPr lvl="1"/>
+            <a:r>
+              <a:rPr lang="en-US" dirty="0"/>
+              <a:t>However, Rust mostly independent now</a:t>
+            </a:r>
+          </a:p>
+          <a:p>
+            <a:r>
+              <a:rPr lang="en-US" dirty="0"/>
               <a:t>Version 1.0 released in May 2015</a:t>
             </a:r>
           </a:p>
@@ -13374,19 +13391,6 @@
             <a:r>
               <a:rPr lang="en-US" dirty="0"/>
               <a:t>New major edition every 3 years</a:t>
-            </a:r>
-          </a:p>
-          <a:p>
-            <a:r>
-              <a:rPr lang="en-US" dirty="0"/>
-              <a:t>Mozilla started sponsoring Rust in 2009</a:t>
-            </a:r>
-          </a:p>
-          <a:p>
-            <a:pPr lvl="1"/>
-            <a:r>
-              <a:rPr lang="en-US" dirty="0"/>
-              <a:t>However, Rust mostly independent now</a:t>
             </a:r>
           </a:p>
           <a:p>
@@ -17446,7 +17450,7 @@
           <a:p>
             <a:r>
               <a:rPr lang="en-US" dirty="0"/>
-              <a:t>Week 2 – Struct Shorthand</a:t>
+              <a:t>Week 2 – Struct</a:t>
             </a:r>
           </a:p>
         </p:txBody>

</xml_diff>